<commit_message>
website updates with new icons
</commit_message>
<xml_diff>
--- a/slides/cds431_week2_2.pptx
+++ b/slides/cds431_week2_2.pptx
@@ -211,7 +211,7 @@
           <a:p>
             <a:fld id="{46234EC1-C695-A64F-92EF-DB486DE9B634}" type="datetimeFigureOut">
               <a:rPr lang="en-US" smtClean="0"/>
-              <a:t>1/25/22</a:t>
+              <a:t>3/15/22</a:t>
             </a:fld>
             <a:endParaRPr lang="en-US"/>
           </a:p>
@@ -1534,7 +1534,7 @@
           <a:p>
             <a:fld id="{3BFC776A-78DE-4C47-BC90-13C95D80858C}" type="datetimeFigureOut">
               <a:rPr lang="en-US" smtClean="0"/>
-              <a:t>1/25/22</a:t>
+              <a:t>3/15/22</a:t>
             </a:fld>
             <a:endParaRPr lang="en-US"/>
           </a:p>
@@ -1732,7 +1732,7 @@
           <a:p>
             <a:fld id="{3BFC776A-78DE-4C47-BC90-13C95D80858C}" type="datetimeFigureOut">
               <a:rPr lang="en-US" smtClean="0"/>
-              <a:t>1/25/22</a:t>
+              <a:t>3/15/22</a:t>
             </a:fld>
             <a:endParaRPr lang="en-US"/>
           </a:p>
@@ -1940,7 +1940,7 @@
           <a:p>
             <a:fld id="{3BFC776A-78DE-4C47-BC90-13C95D80858C}" type="datetimeFigureOut">
               <a:rPr lang="en-US" smtClean="0"/>
-              <a:t>1/25/22</a:t>
+              <a:t>3/15/22</a:t>
             </a:fld>
             <a:endParaRPr lang="en-US"/>
           </a:p>
@@ -2138,7 +2138,7 @@
           <a:p>
             <a:fld id="{3BFC776A-78DE-4C47-BC90-13C95D80858C}" type="datetimeFigureOut">
               <a:rPr lang="en-US" smtClean="0"/>
-              <a:t>1/25/22</a:t>
+              <a:t>3/15/22</a:t>
             </a:fld>
             <a:endParaRPr lang="en-US"/>
           </a:p>
@@ -2413,7 +2413,7 @@
           <a:p>
             <a:fld id="{3BFC776A-78DE-4C47-BC90-13C95D80858C}" type="datetimeFigureOut">
               <a:rPr lang="en-US" smtClean="0"/>
-              <a:t>1/25/22</a:t>
+              <a:t>3/15/22</a:t>
             </a:fld>
             <a:endParaRPr lang="en-US"/>
           </a:p>
@@ -2678,7 +2678,7 @@
           <a:p>
             <a:fld id="{3BFC776A-78DE-4C47-BC90-13C95D80858C}" type="datetimeFigureOut">
               <a:rPr lang="en-US" smtClean="0"/>
-              <a:t>1/25/22</a:t>
+              <a:t>3/15/22</a:t>
             </a:fld>
             <a:endParaRPr lang="en-US"/>
           </a:p>
@@ -3090,7 +3090,7 @@
           <a:p>
             <a:fld id="{3BFC776A-78DE-4C47-BC90-13C95D80858C}" type="datetimeFigureOut">
               <a:rPr lang="en-US" smtClean="0"/>
-              <a:t>1/25/22</a:t>
+              <a:t>3/15/22</a:t>
             </a:fld>
             <a:endParaRPr lang="en-US"/>
           </a:p>
@@ -3231,7 +3231,7 @@
           <a:p>
             <a:fld id="{3BFC776A-78DE-4C47-BC90-13C95D80858C}" type="datetimeFigureOut">
               <a:rPr lang="en-US" smtClean="0"/>
-              <a:t>1/25/22</a:t>
+              <a:t>3/15/22</a:t>
             </a:fld>
             <a:endParaRPr lang="en-US"/>
           </a:p>
@@ -3344,7 +3344,7 @@
           <a:p>
             <a:fld id="{3BFC776A-78DE-4C47-BC90-13C95D80858C}" type="datetimeFigureOut">
               <a:rPr lang="en-US" smtClean="0"/>
-              <a:t>1/25/22</a:t>
+              <a:t>3/15/22</a:t>
             </a:fld>
             <a:endParaRPr lang="en-US"/>
           </a:p>
@@ -3655,7 +3655,7 @@
           <a:p>
             <a:fld id="{3BFC776A-78DE-4C47-BC90-13C95D80858C}" type="datetimeFigureOut">
               <a:rPr lang="en-US" smtClean="0"/>
-              <a:t>1/25/22</a:t>
+              <a:t>3/15/22</a:t>
             </a:fld>
             <a:endParaRPr lang="en-US"/>
           </a:p>
@@ -3943,7 +3943,7 @@
           <a:p>
             <a:fld id="{3BFC776A-78DE-4C47-BC90-13C95D80858C}" type="datetimeFigureOut">
               <a:rPr lang="en-US" smtClean="0"/>
-              <a:t>1/25/22</a:t>
+              <a:t>3/15/22</a:t>
             </a:fld>
             <a:endParaRPr lang="en-US"/>
           </a:p>
@@ -4214,7 +4214,7 @@
           <a:p>
             <a:fld id="{3BFC776A-78DE-4C47-BC90-13C95D80858C}" type="datetimeFigureOut">
               <a:rPr lang="en-US" smtClean="0"/>
-              <a:t>1/25/22</a:t>
+              <a:t>3/15/22</a:t>
             </a:fld>
             <a:endParaRPr lang="en-US"/>
           </a:p>
@@ -4779,7 +4779,15 @@
             </a:pPr>
             <a:r>
               <a:rPr lang="en-US" sz="3200" dirty="0"/>
-              <a:t>DUE:  April 22, 2021 by 5:00 pm</a:t>
+              <a:t>DUE:  April 22</a:t>
+            </a:r>
+            <a:r>
+              <a:rPr lang="en-US" sz="3200"/>
+              <a:t>, 2022 </a:t>
+            </a:r>
+            <a:r>
+              <a:rPr lang="en-US" sz="3200" dirty="0"/>
+              <a:t>by 5:00 pm</a:t>
             </a:r>
           </a:p>
           <a:p>

</xml_diff>